<commit_message>
Add some more presentation
</commit_message>
<xml_diff>
--- a/docs/Sportsemblr.pptx
+++ b/docs/Sportsemblr.pptx
@@ -15,8 +15,9 @@
     <p:sldId id="266" r:id="rId9"/>
     <p:sldId id="264" r:id="rId10"/>
     <p:sldId id="263" r:id="rId11"/>
-    <p:sldId id="262" r:id="rId12"/>
-    <p:sldId id="258" r:id="rId13"/>
+    <p:sldId id="268" r:id="rId12"/>
+    <p:sldId id="262" r:id="rId13"/>
+    <p:sldId id="258" r:id="rId14"/>
   </p:sldIdLst>
   <p:sldSz cx="12192000" cy="6858000"/>
   <p:notesSz cx="6858000" cy="9144000"/>
@@ -6195,6 +6196,92 @@
           <a:lstStyle/>
           <a:p>
             <a:r>
+              <a:rPr lang="bg-BG" dirty="0" smtClean="0"/>
+              <a:t>Потребителски профил</a:t>
+            </a:r>
+            <a:r>
+              <a:rPr lang="bg-BG" dirty="0"/>
+              <a:t/>
+            </a:r>
+            <a:br>
+              <a:rPr lang="bg-BG" dirty="0"/>
+            </a:br>
+            <a:endParaRPr lang="bg-BG" dirty="0"/>
+          </a:p>
+        </p:txBody>
+      </p:sp>
+      <p:sp>
+        <p:nvSpPr>
+          <p:cNvPr id="3" name="Content Placeholder 2"/>
+          <p:cNvSpPr>
+            <a:spLocks noGrp="1"/>
+          </p:cNvSpPr>
+          <p:nvPr>
+            <p:ph idx="1"/>
+          </p:nvPr>
+        </p:nvSpPr>
+        <p:spPr/>
+        <p:txBody>
+          <a:bodyPr/>
+          <a:lstStyle/>
+          <a:p>
+            <a:endParaRPr lang="bg-BG"/>
+          </a:p>
+        </p:txBody>
+      </p:sp>
+    </p:spTree>
+    <p:extLst>
+      <p:ext uri="{BB962C8B-B14F-4D97-AF65-F5344CB8AC3E}">
+        <p14:creationId xmlns:p14="http://schemas.microsoft.com/office/powerpoint/2010/main" val="208594005"/>
+      </p:ext>
+    </p:extLst>
+  </p:cSld>
+  <p:clrMapOvr>
+    <a:masterClrMapping/>
+  </p:clrMapOvr>
+  <p:timing>
+    <p:tnLst>
+      <p:par>
+        <p:cTn id="1" dur="indefinite" restart="never" nodeType="tmRoot"/>
+      </p:par>
+    </p:tnLst>
+  </p:timing>
+</p:sld>
+</file>
+
+<file path=ppt/slides/slide12.xml><?xml version="1.0" encoding="utf-8"?>
+<p:sld xmlns:a="http://schemas.openxmlformats.org/drawingml/2006/main" xmlns:r="http://schemas.openxmlformats.org/officeDocument/2006/relationships" xmlns:p="http://schemas.openxmlformats.org/presentationml/2006/main">
+  <p:cSld>
+    <p:spTree>
+      <p:nvGrpSpPr>
+        <p:cNvPr id="1" name=""/>
+        <p:cNvGrpSpPr/>
+        <p:nvPr/>
+      </p:nvGrpSpPr>
+      <p:grpSpPr>
+        <a:xfrm>
+          <a:off x="0" y="0"/>
+          <a:ext cx="0" cy="0"/>
+          <a:chOff x="0" y="0"/>
+          <a:chExt cx="0" cy="0"/>
+        </a:xfrm>
+      </p:grpSpPr>
+      <p:sp>
+        <p:nvSpPr>
+          <p:cNvPr id="2" name="Title 1"/>
+          <p:cNvSpPr>
+            <a:spLocks noGrp="1"/>
+          </p:cNvSpPr>
+          <p:nvPr>
+            <p:ph type="title"/>
+          </p:nvPr>
+        </p:nvSpPr>
+        <p:spPr/>
+        <p:txBody>
+          <a:bodyPr/>
+          <a:lstStyle/>
+          <a:p>
+            <a:r>
               <a:rPr lang="bg-BG" dirty="0"/>
               <a:t>Администраторски панел за потребители</a:t>
             </a:r>
@@ -6244,7 +6331,7 @@
 </p:sld>
 </file>
 
-<file path=ppt/slides/slide12.xml><?xml version="1.0" encoding="utf-8"?>
+<file path=ppt/slides/slide13.xml><?xml version="1.0" encoding="utf-8"?>
 <p:sld xmlns:a="http://schemas.openxmlformats.org/drawingml/2006/main" xmlns:r="http://schemas.openxmlformats.org/officeDocument/2006/relationships" xmlns:p="http://schemas.openxmlformats.org/presentationml/2006/main">
   <p:cSld>
     <p:spTree>
@@ -7017,6 +7104,13 @@
             <a:r>
               <a:rPr lang="bg-BG" dirty="0" smtClean="0"/>
               <a:t>Детайли за терен</a:t>
+            </a:r>
+            <a:endParaRPr lang="en-US" dirty="0" smtClean="0"/>
+          </a:p>
+          <a:p>
+            <a:r>
+              <a:rPr lang="bg-BG" dirty="0" smtClean="0"/>
+              <a:t>Потребителски профил</a:t>
             </a:r>
           </a:p>
           <a:p>

</xml_diff>